<commit_message>
Finalizing ELM for ballot.
</commit_message>
<xml_diff>
--- a/Documents/CQL_Technical_Introduction_20140604.pptx
+++ b/Documents/CQL_Technical_Introduction_20140604.pptx
@@ -331,7 +331,7 @@
           <a:p>
             <a:fld id="{AE358F06-F08A-4581-9382-C6FEB46FADBD}" type="datetimeFigureOut">
               <a:rPr lang="en-US" smtClean="0"/>
-              <a:t>7/30/2014</a:t>
+              <a:t>12/4/2014</a:t>
             </a:fld>
             <a:endParaRPr lang="en-US"/>
           </a:p>
@@ -501,7 +501,7 @@
           <a:p>
             <a:fld id="{AE358F06-F08A-4581-9382-C6FEB46FADBD}" type="datetimeFigureOut">
               <a:rPr lang="en-US" smtClean="0"/>
-              <a:t>7/30/2014</a:t>
+              <a:t>12/4/2014</a:t>
             </a:fld>
             <a:endParaRPr lang="en-US"/>
           </a:p>
@@ -681,7 +681,7 @@
           <a:p>
             <a:fld id="{AE358F06-F08A-4581-9382-C6FEB46FADBD}" type="datetimeFigureOut">
               <a:rPr lang="en-US" smtClean="0"/>
-              <a:t>7/30/2014</a:t>
+              <a:t>12/4/2014</a:t>
             </a:fld>
             <a:endParaRPr lang="en-US"/>
           </a:p>
@@ -851,7 +851,7 @@
           <a:p>
             <a:fld id="{AE358F06-F08A-4581-9382-C6FEB46FADBD}" type="datetimeFigureOut">
               <a:rPr lang="en-US" smtClean="0"/>
-              <a:t>7/30/2014</a:t>
+              <a:t>12/4/2014</a:t>
             </a:fld>
             <a:endParaRPr lang="en-US"/>
           </a:p>
@@ -1097,7 +1097,7 @@
           <a:p>
             <a:fld id="{AE358F06-F08A-4581-9382-C6FEB46FADBD}" type="datetimeFigureOut">
               <a:rPr lang="en-US" smtClean="0"/>
-              <a:t>7/30/2014</a:t>
+              <a:t>12/4/2014</a:t>
             </a:fld>
             <a:endParaRPr lang="en-US"/>
           </a:p>
@@ -1385,7 +1385,7 @@
           <a:p>
             <a:fld id="{AE358F06-F08A-4581-9382-C6FEB46FADBD}" type="datetimeFigureOut">
               <a:rPr lang="en-US" smtClean="0"/>
-              <a:t>7/30/2014</a:t>
+              <a:t>12/4/2014</a:t>
             </a:fld>
             <a:endParaRPr lang="en-US"/>
           </a:p>
@@ -1807,7 +1807,7 @@
           <a:p>
             <a:fld id="{AE358F06-F08A-4581-9382-C6FEB46FADBD}" type="datetimeFigureOut">
               <a:rPr lang="en-US" smtClean="0"/>
-              <a:t>7/30/2014</a:t>
+              <a:t>12/4/2014</a:t>
             </a:fld>
             <a:endParaRPr lang="en-US"/>
           </a:p>
@@ -1925,7 +1925,7 @@
           <a:p>
             <a:fld id="{AE358F06-F08A-4581-9382-C6FEB46FADBD}" type="datetimeFigureOut">
               <a:rPr lang="en-US" smtClean="0"/>
-              <a:t>7/30/2014</a:t>
+              <a:t>12/4/2014</a:t>
             </a:fld>
             <a:endParaRPr lang="en-US"/>
           </a:p>
@@ -2020,7 +2020,7 @@
           <a:p>
             <a:fld id="{AE358F06-F08A-4581-9382-C6FEB46FADBD}" type="datetimeFigureOut">
               <a:rPr lang="en-US" smtClean="0"/>
-              <a:t>7/30/2014</a:t>
+              <a:t>12/4/2014</a:t>
             </a:fld>
             <a:endParaRPr lang="en-US"/>
           </a:p>
@@ -2297,7 +2297,7 @@
           <a:p>
             <a:fld id="{AE358F06-F08A-4581-9382-C6FEB46FADBD}" type="datetimeFigureOut">
               <a:rPr lang="en-US" smtClean="0"/>
-              <a:t>7/30/2014</a:t>
+              <a:t>12/4/2014</a:t>
             </a:fld>
             <a:endParaRPr lang="en-US"/>
           </a:p>
@@ -2550,7 +2550,7 @@
           <a:p>
             <a:fld id="{AE358F06-F08A-4581-9382-C6FEB46FADBD}" type="datetimeFigureOut">
               <a:rPr lang="en-US" smtClean="0"/>
-              <a:t>7/30/2014</a:t>
+              <a:t>12/4/2014</a:t>
             </a:fld>
             <a:endParaRPr lang="en-US"/>
           </a:p>
@@ -2763,7 +2763,7 @@
           <a:p>
             <a:fld id="{AE358F06-F08A-4581-9382-C6FEB46FADBD}" type="datetimeFigureOut">
               <a:rPr lang="en-US" smtClean="0"/>
-              <a:t>7/30/2014</a:t>
+              <a:t>12/4/2014</a:t>
             </a:fld>
             <a:endParaRPr lang="en-US"/>
           </a:p>
@@ -4340,7 +4340,7 @@
             <p:ph idx="1"/>
             <p:extLst>
               <p:ext uri="{D42A27DB-BD31-4B8C-83A1-F6EECF244321}">
-                <p14:modId xmlns:p14="http://schemas.microsoft.com/office/powerpoint/2010/main" val="142993698"/>
+                <p14:modId xmlns:p14="http://schemas.microsoft.com/office/powerpoint/2010/main" val="830154271"/>
               </p:ext>
             </p:extLst>
           </p:nvPr>
@@ -4643,19 +4643,13 @@
                     <a:p>
                       <a:r>
                         <a:rPr lang="en-US" dirty="0" smtClean="0"/>
-                        <a:t>X begins Y</a:t>
+                        <a:t>X begins </a:t>
                       </a:r>
-                    </a:p>
-                    <a:p>
                       <a:r>
                         <a:rPr lang="en-US" dirty="0" smtClean="0"/>
                         <a:t>Y</a:t>
                       </a:r>
-                      <a:r>
-                        <a:rPr lang="en-US" baseline="0" dirty="0" smtClean="0"/>
-                        <a:t> begun by X</a:t>
-                      </a:r>
-                      <a:endParaRPr lang="en-US" dirty="0"/>
+                      <a:endParaRPr lang="en-US" dirty="0" smtClean="0"/>
                     </a:p>
                   </a:txBody>
                   <a:tcPr/>
@@ -4763,15 +4757,13 @@
                     <a:p>
                       <a:r>
                         <a:rPr lang="en-US" dirty="0" smtClean="0"/>
-                        <a:t>X ends Y</a:t>
+                        <a:t>X ends </a:t>
                       </a:r>
-                    </a:p>
-                    <a:p>
                       <a:r>
                         <a:rPr lang="en-US" dirty="0" smtClean="0"/>
-                        <a:t>Y ended by X</a:t>
+                        <a:t>Y</a:t>
                       </a:r>
-                      <a:endParaRPr lang="en-US" dirty="0"/>
+                      <a:endParaRPr lang="en-US" dirty="0" smtClean="0"/>
                     </a:p>
                   </a:txBody>
                   <a:tcPr/>
@@ -8905,10 +8897,10 @@
           <a:p>
             <a:pPr algn="ctr"/>
             <a:r>
-              <a:rPr lang="en-US" sz="1600" smtClean="0"/>
+              <a:rPr lang="en-US" sz="1600" dirty="0" smtClean="0"/>
               <a:t>Initial Population Definition</a:t>
             </a:r>
-            <a:endParaRPr lang="en-US" sz="1600"/>
+            <a:endParaRPr lang="en-US" sz="1600" dirty="0"/>
           </a:p>
         </p:txBody>
       </p:sp>

</xml_diff>